<commit_message>
Revision after initial review
Some spelling errors corrected.
</commit_message>
<xml_diff>
--- a/NeSI_I_Have_a Problem_and_I_Need_Support/NeSI_Servcie_Desk.pptx
+++ b/NeSI_I_Have_a Problem_and_I_Need_Support/NeSI_Servcie_Desk.pptx
@@ -202,7 +202,7 @@
           <a:p>
             <a:fld id="{271B8E02-D6ED-C74A-B267-DCBD1F5BCC55}" type="datetime1">
               <a:rPr lang="en-NZ" smtClean="0"/>
-              <a:t>4/03/15</a:t>
+              <a:t>12/03/15</a:t>
             </a:fld>
             <a:endParaRPr lang="en-NZ"/>
           </a:p>
@@ -372,7 +372,7 @@
           <a:p>
             <a:fld id="{D4F863EB-014E-EA45-958A-2E7D6F94880C}" type="datetime1">
               <a:rPr lang="en-NZ" smtClean="0"/>
-              <a:t>4/03/15</a:t>
+              <a:t>12/03/15</a:t>
             </a:fld>
             <a:endParaRPr lang="en-NZ"/>
           </a:p>
@@ -12760,7 +12760,7 @@
             </a:pPr>
             <a:r>
               <a:rPr lang="en-NZ" sz="2000" dirty="0" smtClean="0"/>
-              <a:t>NeSI Staff members personal contacts</a:t>
+              <a:t>NeSI Staff member’s personal contacts</a:t>
             </a:r>
           </a:p>
           <a:p>
@@ -12787,7 +12787,7 @@
             </a:pPr>
             <a:r>
               <a:rPr lang="en-NZ" dirty="0" smtClean="0"/>
-              <a:t>All of the above results in a ticket in NeSI’s Service Desk</a:t>
+              <a:t>Any of the above results in a ticket in NeSI’s Service Desk</a:t>
             </a:r>
             <a:endParaRPr lang="en-NZ" dirty="0"/>
           </a:p>
@@ -12939,7 +12939,6 @@
               <a:rPr lang="en-US" sz="6400" dirty="0" smtClean="0"/>
               <a:t>NeSI used a web based application, Zendesk, to manage its Service Desk</a:t>
             </a:r>
-            <a:endParaRPr lang="en-US" sz="6400" dirty="0" smtClean="0"/>
           </a:p>
           <a:p>
             <a:pPr marL="342900" indent="-342900">
@@ -12951,11 +12950,7 @@
             </a:pPr>
             <a:r>
               <a:rPr lang="en-US" sz="6400" dirty="0" smtClean="0"/>
-              <a:t>NeSI’s </a:t>
-            </a:r>
-            <a:r>
-              <a:rPr lang="en-US" sz="6400" dirty="0" smtClean="0"/>
-              <a:t>Service Desk is maintained by all NeSI staff members around the country</a:t>
+              <a:t>NeSI’s Service Desk is maintained by all NeSI staff members around the country</a:t>
             </a:r>
           </a:p>
           <a:p>
@@ -12981,13 +12976,8 @@
             </a:pPr>
             <a:r>
               <a:rPr lang="en-US" sz="6400" dirty="0" smtClean="0"/>
-              <a:t>All tickets are resolved by domain </a:t>
-            </a:r>
-            <a:r>
-              <a:rPr lang="en-US" sz="6400" dirty="0" smtClean="0"/>
-              <a:t>experts directly</a:t>
-            </a:r>
-            <a:endParaRPr lang="en-US" sz="6400" dirty="0" smtClean="0"/>
+              <a:t>All tickets are resolved by domain experts directly</a:t>
+            </a:r>
           </a:p>
           <a:p>
             <a:pPr marL="790575" lvl="1" indent="-342900">
@@ -14801,56 +14791,71 @@
         <p:spPr/>
         <p:txBody>
           <a:bodyPr>
-            <a:normAutofit fontScale="55000" lnSpcReduction="20000"/>
+            <a:normAutofit fontScale="32500" lnSpcReduction="20000"/>
           </a:bodyPr>
           <a:lstStyle/>
           <a:p>
             <a:pPr marL="342900" indent="-342900">
+              <a:lnSpc>
+                <a:spcPts val="1700"/>
+              </a:lnSpc>
               <a:buFont typeface="Arial"/>
               <a:buChar char="•"/>
             </a:pPr>
             <a:r>
-              <a:rPr lang="en-US" dirty="0" smtClean="0"/>
+              <a:rPr lang="en-US" sz="4400" dirty="0" smtClean="0"/>
               <a:t>A ticket is owned by a domain expert.</a:t>
             </a:r>
           </a:p>
           <a:p>
             <a:pPr marL="342900" indent="-342900">
+              <a:lnSpc>
+                <a:spcPts val="1700"/>
+              </a:lnSpc>
               <a:buFont typeface="Arial"/>
               <a:buChar char="•"/>
             </a:pPr>
             <a:r>
-              <a:rPr lang="en-US" dirty="0" smtClean="0"/>
+              <a:rPr lang="en-US" sz="4400" dirty="0" smtClean="0"/>
               <a:t>Ticket requesters are usually contacted by a domain expert to gather more detail.</a:t>
             </a:r>
           </a:p>
           <a:p>
             <a:pPr marL="342900" indent="-342900">
+              <a:lnSpc>
+                <a:spcPts val="1700"/>
+              </a:lnSpc>
               <a:buFont typeface="Arial"/>
               <a:buChar char="•"/>
             </a:pPr>
             <a:r>
-              <a:rPr lang="en-US" dirty="0" smtClean="0"/>
-              <a:t>Domain experts may seek additional support from other colleagues or assign a ticket to someone who has more knowledge in the ticket’s domain.</a:t>
+              <a:rPr lang="en-US" sz="4400" dirty="0" smtClean="0"/>
+              <a:t>Domain experts may seek additional support from other colleagues or assign a ticket to someone who has more knowledge of the ticket’s domain.</a:t>
             </a:r>
           </a:p>
           <a:p>
             <a:pPr marL="342900" indent="-342900">
+              <a:lnSpc>
+                <a:spcPts val="1700"/>
+              </a:lnSpc>
               <a:buFont typeface="Arial"/>
               <a:buChar char="•"/>
             </a:pPr>
             <a:r>
-              <a:rPr lang="en-US" dirty="0" smtClean="0"/>
-              <a:t>Ticket requesters are typically asked the effeteness of proposed resolution be tickets are set for closure.</a:t>
+              <a:rPr lang="en-US" sz="4400" dirty="0" smtClean="0"/>
+              <a:t>Ticket requesters are typically asked the effectiveness of proposed resolution before the tickets are set as solved.</a:t>
             </a:r>
           </a:p>
           <a:p>
             <a:pPr marL="342900" indent="-342900">
+              <a:lnSpc>
+                <a:spcPts val="1700"/>
+              </a:lnSpc>
               <a:buFont typeface="Arial"/>
               <a:buChar char="•"/>
             </a:pPr>
             <a:r>
-              <a:rPr lang="en-US" dirty="0" smtClean="0"/>
+              <a:rPr lang="en-US" sz="4400" dirty="0" smtClean="0"/>
               <a:t>The Service Desk aims to connect a user who needs support and a domain expert directly.</a:t>
             </a:r>
           </a:p>
@@ -14901,13 +14906,13 @@
         </p:nvSpPr>
         <p:spPr>
           <a:xfrm>
-            <a:off x="6398134" y="1163469"/>
+            <a:off x="6484530" y="943687"/>
             <a:ext cx="2549559" cy="2113634"/>
           </a:xfrm>
           <a:prstGeom prst="cloudCallout">
             <a:avLst>
-              <a:gd name="adj1" fmla="val -32660"/>
-              <a:gd name="adj2" fmla="val 86812"/>
+              <a:gd name="adj1" fmla="val -39366"/>
+              <a:gd name="adj2" fmla="val 67748"/>
             </a:avLst>
           </a:prstGeom>
           <a:solidFill>
@@ -15009,7 +15014,7 @@
             </a:pPr>
             <a:r>
               <a:rPr lang="en-US" dirty="0" smtClean="0"/>
-              <a:t>Positive feedback encourage people who contribute to the Service Desk and help us to monitor our performance</a:t>
+              <a:t>Positive feedback encourages people who contribute to the Service Desk and helps us to monitor our performance</a:t>
             </a:r>
           </a:p>
           <a:p>
@@ -15019,7 +15024,15 @@
             </a:pPr>
             <a:r>
               <a:rPr lang="en-US" dirty="0" smtClean="0"/>
-              <a:t>Negative feedback is appreciated and help us to improve the quality of our services </a:t>
+              <a:t>Negative feedback is important </a:t>
+            </a:r>
+            <a:r>
+              <a:rPr lang="en-US" smtClean="0"/>
+              <a:t>for helping </a:t>
+            </a:r>
+            <a:r>
+              <a:rPr lang="en-US" dirty="0" smtClean="0"/>
+              <a:t>us to improve the quality of our services </a:t>
             </a:r>
             <a:endParaRPr lang="en-US" dirty="0"/>
           </a:p>

</xml_diff>